<commit_message>
update pipeline figure to include other vendors
</commit_message>
<xml_diff>
--- a/paper/figures/pipeline.pptx
+++ b/paper/figures/pipeline.pptx
@@ -6,8 +6,10 @@
   </p:sldMasterIdLst>
   <p:sldIdLst>
     <p:sldId id="256" r:id="rId2"/>
-    <p:sldId id="258" r:id="rId3"/>
-    <p:sldId id="257" r:id="rId4"/>
+    <p:sldId id="259" r:id="rId3"/>
+    <p:sldId id="258" r:id="rId4"/>
+    <p:sldId id="257" r:id="rId5"/>
+    <p:sldId id="260" r:id="rId6"/>
   </p:sldIdLst>
   <p:sldSz cx="12192000" cy="6858000"/>
   <p:notesSz cx="6858000" cy="9144000"/>
@@ -245,7 +247,7 @@
           <a:p>
             <a:fld id="{0621BF35-B844-4EAB-BD7B-7E9CADDC35E5}" type="datetimeFigureOut">
               <a:rPr lang="en-US" smtClean="0"/>
-              <a:t>1/26/2016</a:t>
+              <a:t>1/28/16</a:t>
             </a:fld>
             <a:endParaRPr lang="en-US"/>
           </a:p>
@@ -415,7 +417,7 @@
           <a:p>
             <a:fld id="{0621BF35-B844-4EAB-BD7B-7E9CADDC35E5}" type="datetimeFigureOut">
               <a:rPr lang="en-US" smtClean="0"/>
-              <a:t>1/26/2016</a:t>
+              <a:t>1/28/16</a:t>
             </a:fld>
             <a:endParaRPr lang="en-US"/>
           </a:p>
@@ -595,7 +597,7 @@
           <a:p>
             <a:fld id="{0621BF35-B844-4EAB-BD7B-7E9CADDC35E5}" type="datetimeFigureOut">
               <a:rPr lang="en-US" smtClean="0"/>
-              <a:t>1/26/2016</a:t>
+              <a:t>1/28/16</a:t>
             </a:fld>
             <a:endParaRPr lang="en-US"/>
           </a:p>
@@ -765,7 +767,7 @@
           <a:p>
             <a:fld id="{0621BF35-B844-4EAB-BD7B-7E9CADDC35E5}" type="datetimeFigureOut">
               <a:rPr lang="en-US" smtClean="0"/>
-              <a:t>1/26/2016</a:t>
+              <a:t>1/28/16</a:t>
             </a:fld>
             <a:endParaRPr lang="en-US"/>
           </a:p>
@@ -1011,7 +1013,7 @@
           <a:p>
             <a:fld id="{0621BF35-B844-4EAB-BD7B-7E9CADDC35E5}" type="datetimeFigureOut">
               <a:rPr lang="en-US" smtClean="0"/>
-              <a:t>1/26/2016</a:t>
+              <a:t>1/28/16</a:t>
             </a:fld>
             <a:endParaRPr lang="en-US"/>
           </a:p>
@@ -1243,7 +1245,7 @@
           <a:p>
             <a:fld id="{0621BF35-B844-4EAB-BD7B-7E9CADDC35E5}" type="datetimeFigureOut">
               <a:rPr lang="en-US" smtClean="0"/>
-              <a:t>1/26/2016</a:t>
+              <a:t>1/28/16</a:t>
             </a:fld>
             <a:endParaRPr lang="en-US"/>
           </a:p>
@@ -1610,7 +1612,7 @@
           <a:p>
             <a:fld id="{0621BF35-B844-4EAB-BD7B-7E9CADDC35E5}" type="datetimeFigureOut">
               <a:rPr lang="en-US" smtClean="0"/>
-              <a:t>1/26/2016</a:t>
+              <a:t>1/28/16</a:t>
             </a:fld>
             <a:endParaRPr lang="en-US"/>
           </a:p>
@@ -1728,7 +1730,7 @@
           <a:p>
             <a:fld id="{0621BF35-B844-4EAB-BD7B-7E9CADDC35E5}" type="datetimeFigureOut">
               <a:rPr lang="en-US" smtClean="0"/>
-              <a:t>1/26/2016</a:t>
+              <a:t>1/28/16</a:t>
             </a:fld>
             <a:endParaRPr lang="en-US"/>
           </a:p>
@@ -1823,7 +1825,7 @@
           <a:p>
             <a:fld id="{0621BF35-B844-4EAB-BD7B-7E9CADDC35E5}" type="datetimeFigureOut">
               <a:rPr lang="en-US" smtClean="0"/>
-              <a:t>1/26/2016</a:t>
+              <a:t>1/28/16</a:t>
             </a:fld>
             <a:endParaRPr lang="en-US"/>
           </a:p>
@@ -2100,7 +2102,7 @@
           <a:p>
             <a:fld id="{0621BF35-B844-4EAB-BD7B-7E9CADDC35E5}" type="datetimeFigureOut">
               <a:rPr lang="en-US" smtClean="0"/>
-              <a:t>1/26/2016</a:t>
+              <a:t>1/28/16</a:t>
             </a:fld>
             <a:endParaRPr lang="en-US"/>
           </a:p>
@@ -2353,7 +2355,7 @@
           <a:p>
             <a:fld id="{0621BF35-B844-4EAB-BD7B-7E9CADDC35E5}" type="datetimeFigureOut">
               <a:rPr lang="en-US" smtClean="0"/>
-              <a:t>1/26/2016</a:t>
+              <a:t>1/28/16</a:t>
             </a:fld>
             <a:endParaRPr lang="en-US"/>
           </a:p>
@@ -2566,7 +2568,7 @@
           <a:p>
             <a:fld id="{0621BF35-B844-4EAB-BD7B-7E9CADDC35E5}" type="datetimeFigureOut">
               <a:rPr lang="en-US" smtClean="0"/>
-              <a:t>1/26/2016</a:t>
+              <a:t>1/28/16</a:t>
             </a:fld>
             <a:endParaRPr lang="en-US"/>
           </a:p>
@@ -3233,7 +3235,7 @@
           </p:nvSpPr>
           <p:spPr>
             <a:xfrm>
-              <a:off x="2913577" y="3956148"/>
+              <a:off x="2200897" y="3956148"/>
               <a:ext cx="1069144" cy="374694"/>
             </a:xfrm>
             <a:prstGeom prst="rect">
@@ -3293,7 +3295,7 @@
           </p:nvSpPr>
           <p:spPr>
             <a:xfrm>
-              <a:off x="4289865" y="3956147"/>
+              <a:off x="3578665" y="3956147"/>
               <a:ext cx="1069144" cy="374694"/>
             </a:xfrm>
             <a:prstGeom prst="rect">
@@ -3467,14 +3469,13 @@
             <p:cNvPr id="17" name="Straight Arrow Connector 16"/>
             <p:cNvCxnSpPr>
               <a:stCxn id="10" idx="2"/>
-              <a:endCxn id="11" idx="0"/>
             </p:cNvCxnSpPr>
             <p:nvPr/>
           </p:nvCxnSpPr>
           <p:spPr>
             <a:xfrm flipH="1">
-              <a:off x="3448149" y="3706836"/>
-              <a:ext cx="657392" cy="249312"/>
+              <a:off x="3268201" y="3706836"/>
+              <a:ext cx="837340" cy="249311"/>
             </a:xfrm>
             <a:prstGeom prst="straightConnector1">
               <a:avLst/>
@@ -3514,7 +3515,7 @@
           <p:spPr>
             <a:xfrm>
               <a:off x="4105541" y="3706836"/>
-              <a:ext cx="718896" cy="249311"/>
+              <a:ext cx="7696" cy="249311"/>
             </a:xfrm>
             <a:prstGeom prst="straightConnector1">
               <a:avLst/>
@@ -3805,6 +3806,1425 @@
           </p:nvSpPr>
           <p:spPr>
             <a:xfrm>
+              <a:off x="4830908" y="3212825"/>
+              <a:ext cx="1944571" cy="646331"/>
+            </a:xfrm>
+            <a:prstGeom prst="rect">
+              <a:avLst/>
+            </a:prstGeom>
+            <a:noFill/>
+          </p:spPr>
+          <p:txBody>
+            <a:bodyPr wrap="none" rtlCol="0">
+              <a:spAutoFit/>
+            </a:bodyPr>
+            <a:lstStyle/>
+            <a:p>
+              <a:r>
+                <a:rPr lang="en-US" dirty="0" err="1" smtClean="0">
+                  <a:solidFill>
+                    <a:schemeClr val="tx1">
+                      <a:lumMod val="50000"/>
+                      <a:lumOff val="50000"/>
+                    </a:schemeClr>
+                  </a:solidFill>
+                </a:rPr>
+                <a:t>Config</a:t>
+              </a:r>
+              <a:r>
+                <a:rPr lang="en-US" dirty="0" smtClean="0">
+                  <a:solidFill>
+                    <a:schemeClr val="tx1">
+                      <a:lumMod val="50000"/>
+                      <a:lumOff val="50000"/>
+                    </a:schemeClr>
+                  </a:solidFill>
+                </a:rPr>
+                <a:t> Generation </a:t>
+              </a:r>
+              <a:br>
+                <a:rPr lang="en-US" dirty="0" smtClean="0">
+                  <a:solidFill>
+                    <a:schemeClr val="tx1">
+                      <a:lumMod val="50000"/>
+                      <a:lumOff val="50000"/>
+                    </a:schemeClr>
+                  </a:solidFill>
+                </a:rPr>
+              </a:br>
+              <a:r>
+                <a:rPr lang="en-US" dirty="0" smtClean="0">
+                  <a:solidFill>
+                    <a:schemeClr val="tx1">
+                      <a:lumMod val="50000"/>
+                      <a:lumOff val="50000"/>
+                    </a:schemeClr>
+                  </a:solidFill>
+                </a:rPr>
+                <a:t>+ Minimization</a:t>
+              </a:r>
+              <a:endParaRPr lang="en-US" dirty="0">
+                <a:solidFill>
+                  <a:schemeClr val="tx1">
+                    <a:lumMod val="50000"/>
+                    <a:lumOff val="50000"/>
+                  </a:schemeClr>
+                </a:solidFill>
+              </a:endParaRPr>
+            </a:p>
+          </p:txBody>
+        </p:sp>
+        <p:sp>
+          <p:nvSpPr>
+            <p:cNvPr id="61" name="Freeform 60"/>
+            <p:cNvSpPr/>
+            <p:nvPr/>
+          </p:nvSpPr>
+          <p:spPr>
+            <a:xfrm flipH="1">
+              <a:off x="3096845" y="3344881"/>
+              <a:ext cx="405784" cy="343365"/>
+            </a:xfrm>
+            <a:custGeom>
+              <a:avLst/>
+              <a:gdLst>
+                <a:gd name="connsiteX0" fmla="*/ 0 w 571500"/>
+                <a:gd name="connsiteY0" fmla="*/ 0 h 647700"/>
+                <a:gd name="connsiteX1" fmla="*/ 571500 w 571500"/>
+                <a:gd name="connsiteY1" fmla="*/ 647700 h 647700"/>
+                <a:gd name="connsiteX0" fmla="*/ 0 w 571500"/>
+                <a:gd name="connsiteY0" fmla="*/ 0 h 647700"/>
+                <a:gd name="connsiteX1" fmla="*/ 402981 w 571500"/>
+                <a:gd name="connsiteY1" fmla="*/ 80596 h 647700"/>
+                <a:gd name="connsiteX2" fmla="*/ 571500 w 571500"/>
+                <a:gd name="connsiteY2" fmla="*/ 647700 h 647700"/>
+                <a:gd name="connsiteX0" fmla="*/ 0 w 642179"/>
+                <a:gd name="connsiteY0" fmla="*/ 0 h 647700"/>
+                <a:gd name="connsiteX1" fmla="*/ 402981 w 642179"/>
+                <a:gd name="connsiteY1" fmla="*/ 80596 h 647700"/>
+                <a:gd name="connsiteX2" fmla="*/ 637442 w 642179"/>
+                <a:gd name="connsiteY2" fmla="*/ 361950 h 647700"/>
+                <a:gd name="connsiteX3" fmla="*/ 571500 w 642179"/>
+                <a:gd name="connsiteY3" fmla="*/ 647700 h 647700"/>
+                <a:gd name="connsiteX0" fmla="*/ 0 w 638397"/>
+                <a:gd name="connsiteY0" fmla="*/ 0 h 594378"/>
+                <a:gd name="connsiteX1" fmla="*/ 402981 w 638397"/>
+                <a:gd name="connsiteY1" fmla="*/ 80596 h 594378"/>
+                <a:gd name="connsiteX2" fmla="*/ 637442 w 638397"/>
+                <a:gd name="connsiteY2" fmla="*/ 361950 h 594378"/>
+                <a:gd name="connsiteX3" fmla="*/ 78248 w 638397"/>
+                <a:gd name="connsiteY3" fmla="*/ 594378 h 594378"/>
+                <a:gd name="connsiteX0" fmla="*/ 0 w 638344"/>
+                <a:gd name="connsiteY0" fmla="*/ 0 h 573050"/>
+                <a:gd name="connsiteX1" fmla="*/ 402981 w 638344"/>
+                <a:gd name="connsiteY1" fmla="*/ 80596 h 573050"/>
+                <a:gd name="connsiteX2" fmla="*/ 637442 w 638344"/>
+                <a:gd name="connsiteY2" fmla="*/ 361950 h 573050"/>
+                <a:gd name="connsiteX3" fmla="*/ 41255 w 638344"/>
+                <a:gd name="connsiteY3" fmla="*/ 573050 h 573050"/>
+                <a:gd name="connsiteX0" fmla="*/ 0 w 613717"/>
+                <a:gd name="connsiteY0" fmla="*/ 0 h 573050"/>
+                <a:gd name="connsiteX1" fmla="*/ 402981 w 613717"/>
+                <a:gd name="connsiteY1" fmla="*/ 80596 h 573050"/>
+                <a:gd name="connsiteX2" fmla="*/ 612780 w 613717"/>
+                <a:gd name="connsiteY2" fmla="*/ 351286 h 573050"/>
+                <a:gd name="connsiteX3" fmla="*/ 41255 w 613717"/>
+                <a:gd name="connsiteY3" fmla="*/ 573050 h 573050"/>
+                <a:gd name="connsiteX0" fmla="*/ 0 w 612780"/>
+                <a:gd name="connsiteY0" fmla="*/ 0 h 573050"/>
+                <a:gd name="connsiteX1" fmla="*/ 402981 w 612780"/>
+                <a:gd name="connsiteY1" fmla="*/ 80596 h 573050"/>
+                <a:gd name="connsiteX2" fmla="*/ 612780 w 612780"/>
+                <a:gd name="connsiteY2" fmla="*/ 351286 h 573050"/>
+                <a:gd name="connsiteX3" fmla="*/ 41255 w 612780"/>
+                <a:gd name="connsiteY3" fmla="*/ 573050 h 573050"/>
+                <a:gd name="connsiteX0" fmla="*/ 0 w 612780"/>
+                <a:gd name="connsiteY0" fmla="*/ 0 h 573050"/>
+                <a:gd name="connsiteX1" fmla="*/ 402981 w 612780"/>
+                <a:gd name="connsiteY1" fmla="*/ 80596 h 573050"/>
+                <a:gd name="connsiteX2" fmla="*/ 612780 w 612780"/>
+                <a:gd name="connsiteY2" fmla="*/ 351286 h 573050"/>
+                <a:gd name="connsiteX3" fmla="*/ 41255 w 612780"/>
+                <a:gd name="connsiteY3" fmla="*/ 573050 h 573050"/>
+                <a:gd name="connsiteX0" fmla="*/ 0 w 600449"/>
+                <a:gd name="connsiteY0" fmla="*/ 43944 h 499687"/>
+                <a:gd name="connsiteX1" fmla="*/ 390650 w 600449"/>
+                <a:gd name="connsiteY1" fmla="*/ 7233 h 499687"/>
+                <a:gd name="connsiteX2" fmla="*/ 600449 w 600449"/>
+                <a:gd name="connsiteY2" fmla="*/ 277923 h 499687"/>
+                <a:gd name="connsiteX3" fmla="*/ 28924 w 600449"/>
+                <a:gd name="connsiteY3" fmla="*/ 499687 h 499687"/>
+                <a:gd name="connsiteX0" fmla="*/ 8302 w 608751"/>
+                <a:gd name="connsiteY0" fmla="*/ 43944 h 401331"/>
+                <a:gd name="connsiteX1" fmla="*/ 398952 w 608751"/>
+                <a:gd name="connsiteY1" fmla="*/ 7233 h 401331"/>
+                <a:gd name="connsiteX2" fmla="*/ 608751 w 608751"/>
+                <a:gd name="connsiteY2" fmla="*/ 277923 h 401331"/>
+                <a:gd name="connsiteX3" fmla="*/ 232 w 608751"/>
+                <a:gd name="connsiteY3" fmla="*/ 382380 h 401331"/>
+                <a:gd name="connsiteX0" fmla="*/ 8303 w 608752"/>
+                <a:gd name="connsiteY0" fmla="*/ 43944 h 375699"/>
+                <a:gd name="connsiteX1" fmla="*/ 398953 w 608752"/>
+                <a:gd name="connsiteY1" fmla="*/ 7233 h 375699"/>
+                <a:gd name="connsiteX2" fmla="*/ 608752 w 608752"/>
+                <a:gd name="connsiteY2" fmla="*/ 277923 h 375699"/>
+                <a:gd name="connsiteX3" fmla="*/ 233 w 608752"/>
+                <a:gd name="connsiteY3" fmla="*/ 297065 h 375699"/>
+                <a:gd name="connsiteX0" fmla="*/ 8380 w 505607"/>
+                <a:gd name="connsiteY0" fmla="*/ 43944 h 351927"/>
+                <a:gd name="connsiteX1" fmla="*/ 399030 w 505607"/>
+                <a:gd name="connsiteY1" fmla="*/ 7233 h 351927"/>
+                <a:gd name="connsiteX2" fmla="*/ 485517 w 505607"/>
+                <a:gd name="connsiteY2" fmla="*/ 245929 h 351927"/>
+                <a:gd name="connsiteX3" fmla="*/ 310 w 505607"/>
+                <a:gd name="connsiteY3" fmla="*/ 297065 h 351927"/>
+                <a:gd name="connsiteX0" fmla="*/ 8380 w 485517"/>
+                <a:gd name="connsiteY0" fmla="*/ 0 h 307983"/>
+                <a:gd name="connsiteX1" fmla="*/ 349705 w 485517"/>
+                <a:gd name="connsiteY1" fmla="*/ 16610 h 307983"/>
+                <a:gd name="connsiteX2" fmla="*/ 485517 w 485517"/>
+                <a:gd name="connsiteY2" fmla="*/ 201985 h 307983"/>
+                <a:gd name="connsiteX3" fmla="*/ 310 w 485517"/>
+                <a:gd name="connsiteY3" fmla="*/ 253121 h 307983"/>
+                <a:gd name="connsiteX0" fmla="*/ 8380 w 485517"/>
+                <a:gd name="connsiteY0" fmla="*/ 0 h 307983"/>
+                <a:gd name="connsiteX1" fmla="*/ 349705 w 485517"/>
+                <a:gd name="connsiteY1" fmla="*/ 16610 h 307983"/>
+                <a:gd name="connsiteX2" fmla="*/ 485517 w 485517"/>
+                <a:gd name="connsiteY2" fmla="*/ 201985 h 307983"/>
+                <a:gd name="connsiteX3" fmla="*/ 310 w 485517"/>
+                <a:gd name="connsiteY3" fmla="*/ 253121 h 307983"/>
+                <a:gd name="connsiteX0" fmla="*/ 8380 w 522529"/>
+                <a:gd name="connsiteY0" fmla="*/ 0 h 307983"/>
+                <a:gd name="connsiteX1" fmla="*/ 349705 w 522529"/>
+                <a:gd name="connsiteY1" fmla="*/ 16610 h 307983"/>
+                <a:gd name="connsiteX2" fmla="*/ 485517 w 522529"/>
+                <a:gd name="connsiteY2" fmla="*/ 201985 h 307983"/>
+                <a:gd name="connsiteX3" fmla="*/ 310 w 522529"/>
+                <a:gd name="connsiteY3" fmla="*/ 253121 h 307983"/>
+                <a:gd name="connsiteX0" fmla="*/ 8380 w 537806"/>
+                <a:gd name="connsiteY0" fmla="*/ 0 h 307983"/>
+                <a:gd name="connsiteX1" fmla="*/ 349705 w 537806"/>
+                <a:gd name="connsiteY1" fmla="*/ 16610 h 307983"/>
+                <a:gd name="connsiteX2" fmla="*/ 485517 w 537806"/>
+                <a:gd name="connsiteY2" fmla="*/ 201985 h 307983"/>
+                <a:gd name="connsiteX3" fmla="*/ 310 w 537806"/>
+                <a:gd name="connsiteY3" fmla="*/ 253121 h 307983"/>
+                <a:gd name="connsiteX0" fmla="*/ 8380 w 485517"/>
+                <a:gd name="connsiteY0" fmla="*/ 0 h 307983"/>
+                <a:gd name="connsiteX1" fmla="*/ 349705 w 485517"/>
+                <a:gd name="connsiteY1" fmla="*/ 16610 h 307983"/>
+                <a:gd name="connsiteX2" fmla="*/ 485517 w 485517"/>
+                <a:gd name="connsiteY2" fmla="*/ 201985 h 307983"/>
+                <a:gd name="connsiteX3" fmla="*/ 310 w 485517"/>
+                <a:gd name="connsiteY3" fmla="*/ 253121 h 307983"/>
+                <a:gd name="connsiteX0" fmla="*/ 8380 w 485517"/>
+                <a:gd name="connsiteY0" fmla="*/ 10985 h 318968"/>
+                <a:gd name="connsiteX1" fmla="*/ 349705 w 485517"/>
+                <a:gd name="connsiteY1" fmla="*/ 27595 h 318968"/>
+                <a:gd name="connsiteX2" fmla="*/ 485517 w 485517"/>
+                <a:gd name="connsiteY2" fmla="*/ 212970 h 318968"/>
+                <a:gd name="connsiteX3" fmla="*/ 310 w 485517"/>
+                <a:gd name="connsiteY3" fmla="*/ 264106 h 318968"/>
+                <a:gd name="connsiteX0" fmla="*/ 8380 w 485517"/>
+                <a:gd name="connsiteY0" fmla="*/ 94491 h 306495"/>
+                <a:gd name="connsiteX1" fmla="*/ 349705 w 485517"/>
+                <a:gd name="connsiteY1" fmla="*/ 15122 h 306495"/>
+                <a:gd name="connsiteX2" fmla="*/ 485517 w 485517"/>
+                <a:gd name="connsiteY2" fmla="*/ 200497 h 306495"/>
+                <a:gd name="connsiteX3" fmla="*/ 310 w 485517"/>
+                <a:gd name="connsiteY3" fmla="*/ 251633 h 306495"/>
+                <a:gd name="connsiteX0" fmla="*/ 8380 w 485517"/>
+                <a:gd name="connsiteY0" fmla="*/ 84621 h 296625"/>
+                <a:gd name="connsiteX1" fmla="*/ 263386 w 485517"/>
+                <a:gd name="connsiteY1" fmla="*/ 15916 h 296625"/>
+                <a:gd name="connsiteX2" fmla="*/ 485517 w 485517"/>
+                <a:gd name="connsiteY2" fmla="*/ 190627 h 296625"/>
+                <a:gd name="connsiteX3" fmla="*/ 310 w 485517"/>
+                <a:gd name="connsiteY3" fmla="*/ 241763 h 296625"/>
+                <a:gd name="connsiteX0" fmla="*/ 8380 w 485517"/>
+                <a:gd name="connsiteY0" fmla="*/ 104438 h 316442"/>
+                <a:gd name="connsiteX1" fmla="*/ 349705 w 485517"/>
+                <a:gd name="connsiteY1" fmla="*/ 14404 h 316442"/>
+                <a:gd name="connsiteX2" fmla="*/ 485517 w 485517"/>
+                <a:gd name="connsiteY2" fmla="*/ 210444 h 316442"/>
+                <a:gd name="connsiteX3" fmla="*/ 310 w 485517"/>
+                <a:gd name="connsiteY3" fmla="*/ 261580 h 316442"/>
+                <a:gd name="connsiteX0" fmla="*/ 8380 w 485517"/>
+                <a:gd name="connsiteY0" fmla="*/ 104438 h 316442"/>
+                <a:gd name="connsiteX1" fmla="*/ 275718 w 485517"/>
+                <a:gd name="connsiteY1" fmla="*/ 14404 h 316442"/>
+                <a:gd name="connsiteX2" fmla="*/ 485517 w 485517"/>
+                <a:gd name="connsiteY2" fmla="*/ 210444 h 316442"/>
+                <a:gd name="connsiteX3" fmla="*/ 310 w 485517"/>
+                <a:gd name="connsiteY3" fmla="*/ 261580 h 316442"/>
+                <a:gd name="connsiteX0" fmla="*/ 8380 w 485517"/>
+                <a:gd name="connsiteY0" fmla="*/ 104438 h 316442"/>
+                <a:gd name="connsiteX1" fmla="*/ 275718 w 485517"/>
+                <a:gd name="connsiteY1" fmla="*/ 14404 h 316442"/>
+                <a:gd name="connsiteX2" fmla="*/ 485517 w 485517"/>
+                <a:gd name="connsiteY2" fmla="*/ 210444 h 316442"/>
+                <a:gd name="connsiteX3" fmla="*/ 310 w 485517"/>
+                <a:gd name="connsiteY3" fmla="*/ 261580 h 316442"/>
+                <a:gd name="connsiteX0" fmla="*/ 8380 w 485517"/>
+                <a:gd name="connsiteY0" fmla="*/ 36988 h 323642"/>
+                <a:gd name="connsiteX1" fmla="*/ 275718 w 485517"/>
+                <a:gd name="connsiteY1" fmla="*/ 21604 h 323642"/>
+                <a:gd name="connsiteX2" fmla="*/ 485517 w 485517"/>
+                <a:gd name="connsiteY2" fmla="*/ 217644 h 323642"/>
+                <a:gd name="connsiteX3" fmla="*/ 310 w 485517"/>
+                <a:gd name="connsiteY3" fmla="*/ 268780 h 323642"/>
+                <a:gd name="connsiteX0" fmla="*/ 8380 w 485517"/>
+                <a:gd name="connsiteY0" fmla="*/ 36988 h 345281"/>
+                <a:gd name="connsiteX1" fmla="*/ 275718 w 485517"/>
+                <a:gd name="connsiteY1" fmla="*/ 21604 h 345281"/>
+                <a:gd name="connsiteX2" fmla="*/ 485517 w 485517"/>
+                <a:gd name="connsiteY2" fmla="*/ 217644 h 345281"/>
+                <a:gd name="connsiteX3" fmla="*/ 310 w 485517"/>
+                <a:gd name="connsiteY3" fmla="*/ 332765 h 345281"/>
+                <a:gd name="connsiteX0" fmla="*/ 8380 w 485517"/>
+                <a:gd name="connsiteY0" fmla="*/ 15444 h 323737"/>
+                <a:gd name="connsiteX1" fmla="*/ 275718 w 485517"/>
+                <a:gd name="connsiteY1" fmla="*/ 60 h 323737"/>
+                <a:gd name="connsiteX2" fmla="*/ 485517 w 485517"/>
+                <a:gd name="connsiteY2" fmla="*/ 196100 h 323737"/>
+                <a:gd name="connsiteX3" fmla="*/ 310 w 485517"/>
+                <a:gd name="connsiteY3" fmla="*/ 311221 h 323737"/>
+                <a:gd name="connsiteX0" fmla="*/ 8353 w 485490"/>
+                <a:gd name="connsiteY0" fmla="*/ 15444 h 319348"/>
+                <a:gd name="connsiteX1" fmla="*/ 275691 w 485490"/>
+                <a:gd name="connsiteY1" fmla="*/ 60 h 319348"/>
+                <a:gd name="connsiteX2" fmla="*/ 485490 w 485490"/>
+                <a:gd name="connsiteY2" fmla="*/ 196100 h 319348"/>
+                <a:gd name="connsiteX3" fmla="*/ 283 w 485490"/>
+                <a:gd name="connsiteY3" fmla="*/ 311221 h 319348"/>
+                <a:gd name="connsiteX0" fmla="*/ 8353 w 498732"/>
+                <a:gd name="connsiteY0" fmla="*/ 15444 h 319348"/>
+                <a:gd name="connsiteX1" fmla="*/ 275691 w 498732"/>
+                <a:gd name="connsiteY1" fmla="*/ 60 h 319348"/>
+                <a:gd name="connsiteX2" fmla="*/ 485490 w 498732"/>
+                <a:gd name="connsiteY2" fmla="*/ 196100 h 319348"/>
+                <a:gd name="connsiteX3" fmla="*/ 283 w 498732"/>
+                <a:gd name="connsiteY3" fmla="*/ 311221 h 319348"/>
+              </a:gdLst>
+              <a:ahLst/>
+              <a:cxnLst>
+                <a:cxn ang="0">
+                  <a:pos x="connsiteX0" y="connsiteY0"/>
+                </a:cxn>
+                <a:cxn ang="0">
+                  <a:pos x="connsiteX1" y="connsiteY1"/>
+                </a:cxn>
+                <a:cxn ang="0">
+                  <a:pos x="connsiteX2" y="connsiteY2"/>
+                </a:cxn>
+                <a:cxn ang="0">
+                  <a:pos x="connsiteX3" y="connsiteY3"/>
+                </a:cxn>
+              </a:cxnLst>
+              <a:rect l="l" t="t" r="r" b="b"/>
+              <a:pathLst>
+                <a:path w="498732" h="319348">
+                  <a:moveTo>
+                    <a:pt x="8353" y="15444"/>
+                  </a:moveTo>
+                  <a:cubicBezTo>
+                    <a:pt x="36440" y="42554"/>
+                    <a:pt x="18622" y="-1834"/>
+                    <a:pt x="275691" y="60"/>
+                  </a:cubicBezTo>
+                  <a:cubicBezTo>
+                    <a:pt x="457136" y="15775"/>
+                    <a:pt x="531391" y="101583"/>
+                    <a:pt x="485490" y="196100"/>
+                  </a:cubicBezTo>
+                  <a:cubicBezTo>
+                    <a:pt x="390264" y="418588"/>
+                    <a:pt x="-12173" y="261642"/>
+                    <a:pt x="283" y="311221"/>
+                  </a:cubicBezTo>
+                </a:path>
+              </a:pathLst>
+            </a:custGeom>
+            <a:noFill/>
+            <a:ln w="38100">
+              <a:solidFill>
+                <a:schemeClr val="tx1"/>
+              </a:solidFill>
+              <a:headEnd type="none"/>
+              <a:tailEnd type="triangle"/>
+            </a:ln>
+            <a:scene3d>
+              <a:camera prst="orthographicFront">
+                <a:rot lat="0" lon="19499988" rev="0"/>
+              </a:camera>
+              <a:lightRig rig="threePt" dir="t"/>
+            </a:scene3d>
+          </p:spPr>
+          <p:style>
+            <a:lnRef idx="2">
+              <a:schemeClr val="accent1">
+                <a:shade val="50000"/>
+              </a:schemeClr>
+            </a:lnRef>
+            <a:fillRef idx="1">
+              <a:schemeClr val="accent1"/>
+            </a:fillRef>
+            <a:effectRef idx="0">
+              <a:schemeClr val="accent1"/>
+            </a:effectRef>
+            <a:fontRef idx="minor">
+              <a:schemeClr val="lt1"/>
+            </a:fontRef>
+          </p:style>
+          <p:txBody>
+            <a:bodyPr rtlCol="0" anchor="ctr"/>
+            <a:lstStyle/>
+            <a:p>
+              <a:pPr algn="ctr"/>
+              <a:endParaRPr lang="en-US"/>
+            </a:p>
+          </p:txBody>
+        </p:sp>
+        <p:sp>
+          <p:nvSpPr>
+            <p:cNvPr id="62" name="TextBox 61"/>
+            <p:cNvSpPr txBox="1"/>
+            <p:nvPr/>
+          </p:nvSpPr>
+          <p:spPr>
+            <a:xfrm>
+              <a:off x="4837824" y="1925268"/>
+              <a:ext cx="1899879" cy="646331"/>
+            </a:xfrm>
+            <a:prstGeom prst="rect">
+              <a:avLst/>
+            </a:prstGeom>
+            <a:noFill/>
+          </p:spPr>
+          <p:txBody>
+            <a:bodyPr wrap="none" rtlCol="0">
+              <a:spAutoFit/>
+            </a:bodyPr>
+            <a:lstStyle/>
+            <a:p>
+              <a:r>
+                <a:rPr lang="en-US" dirty="0" smtClean="0">
+                  <a:solidFill>
+                    <a:schemeClr val="tx1">
+                      <a:lumMod val="50000"/>
+                      <a:lumOff val="50000"/>
+                    </a:schemeClr>
+                  </a:solidFill>
+                </a:rPr>
+                <a:t>Rewriting Rules + </a:t>
+              </a:r>
+            </a:p>
+            <a:p>
+              <a:r>
+                <a:rPr lang="en-US" dirty="0" smtClean="0">
+                  <a:solidFill>
+                    <a:schemeClr val="tx1">
+                      <a:lumMod val="50000"/>
+                      <a:lumOff val="50000"/>
+                    </a:schemeClr>
+                  </a:solidFill>
+                </a:rPr>
+                <a:t>Well-</a:t>
+              </a:r>
+              <a:r>
+                <a:rPr lang="en-US" dirty="0" err="1" smtClean="0">
+                  <a:solidFill>
+                    <a:schemeClr val="tx1">
+                      <a:lumMod val="50000"/>
+                      <a:lumOff val="50000"/>
+                    </a:schemeClr>
+                  </a:solidFill>
+                </a:rPr>
+                <a:t>Formedness</a:t>
+              </a:r>
+              <a:endParaRPr lang="en-US" dirty="0">
+                <a:solidFill>
+                  <a:schemeClr val="tx1">
+                    <a:lumMod val="50000"/>
+                    <a:lumOff val="50000"/>
+                  </a:schemeClr>
+                </a:solidFill>
+              </a:endParaRPr>
+            </a:p>
+          </p:txBody>
+        </p:sp>
+      </p:grpSp>
+      <p:sp>
+        <p:nvSpPr>
+          <p:cNvPr id="22" name="Rectangle 21"/>
+          <p:cNvSpPr/>
+          <p:nvPr/>
+        </p:nvSpPr>
+        <p:spPr>
+          <a:xfrm>
+            <a:off x="6466462" y="3299139"/>
+            <a:ext cx="1069144" cy="374694"/>
+          </a:xfrm>
+          <a:prstGeom prst="rect">
+            <a:avLst/>
+          </a:prstGeom>
+          <a:solidFill>
+            <a:schemeClr val="bg1"/>
+          </a:solidFill>
+          <a:ln>
+            <a:solidFill>
+              <a:schemeClr val="tx1"/>
+            </a:solidFill>
+          </a:ln>
+        </p:spPr>
+        <p:style>
+          <a:lnRef idx="2">
+            <a:schemeClr val="accent1">
+              <a:shade val="50000"/>
+            </a:schemeClr>
+          </a:lnRef>
+          <a:fillRef idx="1">
+            <a:schemeClr val="accent1"/>
+          </a:fillRef>
+          <a:effectRef idx="0">
+            <a:schemeClr val="accent1"/>
+          </a:effectRef>
+          <a:fontRef idx="minor">
+            <a:schemeClr val="lt1"/>
+          </a:fontRef>
+        </p:style>
+        <p:txBody>
+          <a:bodyPr rtlCol="0" anchor="ctr"/>
+          <a:lstStyle/>
+          <a:p>
+            <a:pPr algn="ctr"/>
+            <a:r>
+              <a:rPr lang="is-IS" dirty="0" smtClean="0">
+                <a:solidFill>
+                  <a:schemeClr val="tx1"/>
+                </a:solidFill>
+              </a:rPr>
+              <a:t>…</a:t>
+            </a:r>
+            <a:endParaRPr lang="en-US" dirty="0">
+              <a:solidFill>
+                <a:schemeClr val="tx1"/>
+              </a:solidFill>
+            </a:endParaRPr>
+          </a:p>
+        </p:txBody>
+      </p:sp>
+      <p:cxnSp>
+        <p:nvCxnSpPr>
+          <p:cNvPr id="26" name="Straight Arrow Connector 25"/>
+          <p:cNvCxnSpPr>
+            <a:stCxn id="10" idx="2"/>
+          </p:cNvCxnSpPr>
+          <p:nvPr/>
+        </p:nvCxnSpPr>
+        <p:spPr>
+          <a:xfrm>
+            <a:off x="5609960" y="3049828"/>
+            <a:ext cx="862112" cy="249311"/>
+          </a:xfrm>
+          <a:prstGeom prst="straightConnector1">
+            <a:avLst/>
+          </a:prstGeom>
+          <a:ln w="38100">
+            <a:solidFill>
+              <a:schemeClr val="tx1"/>
+            </a:solidFill>
+            <a:prstDash val="solid"/>
+            <a:tailEnd type="triangle"/>
+          </a:ln>
+        </p:spPr>
+        <p:style>
+          <a:lnRef idx="1">
+            <a:schemeClr val="accent1"/>
+          </a:lnRef>
+          <a:fillRef idx="0">
+            <a:schemeClr val="accent1"/>
+          </a:fillRef>
+          <a:effectRef idx="0">
+            <a:schemeClr val="accent1"/>
+          </a:effectRef>
+          <a:fontRef idx="minor">
+            <a:schemeClr val="tx1"/>
+          </a:fontRef>
+        </p:style>
+      </p:cxnSp>
+    </p:spTree>
+    <p:extLst>
+      <p:ext uri="{BB962C8B-B14F-4D97-AF65-F5344CB8AC3E}">
+        <p14:creationId xmlns:p14="http://schemas.microsoft.com/office/powerpoint/2010/main" val="3044673839"/>
+      </p:ext>
+    </p:extLst>
+  </p:cSld>
+  <p:clrMapOvr>
+    <a:masterClrMapping/>
+  </p:clrMapOvr>
+  <p:timing>
+    <p:tnLst>
+      <p:par>
+        <p:cTn id="1" dur="indefinite" restart="never" nodeType="tmRoot"/>
+      </p:par>
+    </p:tnLst>
+  </p:timing>
+</p:sld>
+</file>
+
+<file path=ppt/slides/slide2.xml><?xml version="1.0" encoding="utf-8"?>
+<p:sld xmlns:a="http://schemas.openxmlformats.org/drawingml/2006/main" xmlns:r="http://schemas.openxmlformats.org/officeDocument/2006/relationships" xmlns:p="http://schemas.openxmlformats.org/presentationml/2006/main">
+  <p:cSld>
+    <p:spTree>
+      <p:nvGrpSpPr>
+        <p:cNvPr id="1" name=""/>
+        <p:cNvGrpSpPr/>
+        <p:nvPr/>
+      </p:nvGrpSpPr>
+      <p:grpSpPr>
+        <a:xfrm>
+          <a:off x="0" y="0"/>
+          <a:ext cx="0" cy="0"/>
+          <a:chOff x="0" y="0"/>
+          <a:chExt cx="0" cy="0"/>
+        </a:xfrm>
+      </p:grpSpPr>
+      <p:grpSp>
+        <p:nvGrpSpPr>
+          <p:cNvPr id="76" name="Group 75"/>
+          <p:cNvGrpSpPr/>
+          <p:nvPr/>
+        </p:nvGrpSpPr>
+        <p:grpSpPr>
+          <a:xfrm>
+            <a:off x="3009900" y="770863"/>
+            <a:ext cx="5334045" cy="2902971"/>
+            <a:chOff x="1505481" y="1427871"/>
+            <a:chExt cx="5334045" cy="2902971"/>
+          </a:xfrm>
+        </p:grpSpPr>
+        <p:sp>
+          <p:nvSpPr>
+            <p:cNvPr id="4" name="Rectangle 3"/>
+            <p:cNvSpPr/>
+            <p:nvPr/>
+          </p:nvSpPr>
+          <p:spPr>
+            <a:xfrm>
+              <a:off x="3474721" y="1432560"/>
+              <a:ext cx="1261640" cy="351693"/>
+            </a:xfrm>
+            <a:prstGeom prst="rect">
+              <a:avLst/>
+            </a:prstGeom>
+            <a:solidFill>
+              <a:schemeClr val="bg1"/>
+            </a:solidFill>
+            <a:ln>
+              <a:solidFill>
+                <a:schemeClr val="tx1"/>
+              </a:solidFill>
+            </a:ln>
+          </p:spPr>
+          <p:style>
+            <a:lnRef idx="2">
+              <a:schemeClr val="accent1">
+                <a:shade val="50000"/>
+              </a:schemeClr>
+            </a:lnRef>
+            <a:fillRef idx="1">
+              <a:schemeClr val="accent1"/>
+            </a:fillRef>
+            <a:effectRef idx="0">
+              <a:schemeClr val="accent1"/>
+            </a:effectRef>
+            <a:fontRef idx="minor">
+              <a:schemeClr val="lt1"/>
+            </a:fontRef>
+          </p:style>
+          <p:txBody>
+            <a:bodyPr rtlCol="0" anchor="ctr"/>
+            <a:lstStyle/>
+            <a:p>
+              <a:pPr algn="ctr"/>
+              <a:r>
+                <a:rPr lang="en-US" dirty="0" smtClean="0">
+                  <a:solidFill>
+                    <a:schemeClr val="tx1"/>
+                  </a:solidFill>
+                </a:rPr>
+                <a:t>Propane FE</a:t>
+              </a:r>
+              <a:endParaRPr lang="en-US" dirty="0">
+                <a:solidFill>
+                  <a:schemeClr val="tx1"/>
+                </a:solidFill>
+              </a:endParaRPr>
+            </a:p>
+          </p:txBody>
+        </p:sp>
+        <p:sp>
+          <p:nvSpPr>
+            <p:cNvPr id="8" name="Rectangle 7"/>
+            <p:cNvSpPr/>
+            <p:nvPr/>
+          </p:nvSpPr>
+          <p:spPr>
+            <a:xfrm>
+              <a:off x="3474721" y="2072535"/>
+              <a:ext cx="1261640" cy="347889"/>
+            </a:xfrm>
+            <a:prstGeom prst="rect">
+              <a:avLst/>
+            </a:prstGeom>
+            <a:solidFill>
+              <a:schemeClr val="bg1"/>
+            </a:solidFill>
+            <a:ln>
+              <a:solidFill>
+                <a:schemeClr val="tx1"/>
+              </a:solidFill>
+            </a:ln>
+          </p:spPr>
+          <p:style>
+            <a:lnRef idx="2">
+              <a:schemeClr val="accent1">
+                <a:shade val="50000"/>
+              </a:schemeClr>
+            </a:lnRef>
+            <a:fillRef idx="1">
+              <a:schemeClr val="accent1"/>
+            </a:fillRef>
+            <a:effectRef idx="0">
+              <a:schemeClr val="accent1"/>
+            </a:effectRef>
+            <a:fontRef idx="minor">
+              <a:schemeClr val="lt1"/>
+            </a:fontRef>
+          </p:style>
+          <p:txBody>
+            <a:bodyPr rtlCol="0" anchor="ctr"/>
+            <a:lstStyle/>
+            <a:p>
+              <a:pPr algn="ctr"/>
+              <a:r>
+                <a:rPr lang="en-US" dirty="0" smtClean="0">
+                  <a:solidFill>
+                    <a:schemeClr val="tx1"/>
+                  </a:solidFill>
+                </a:rPr>
+                <a:t>RIR</a:t>
+              </a:r>
+              <a:endParaRPr lang="en-US" dirty="0">
+                <a:solidFill>
+                  <a:schemeClr val="tx1"/>
+                </a:solidFill>
+              </a:endParaRPr>
+            </a:p>
+          </p:txBody>
+        </p:sp>
+        <p:sp>
+          <p:nvSpPr>
+            <p:cNvPr id="9" name="Rectangle 8"/>
+            <p:cNvSpPr/>
+            <p:nvPr/>
+          </p:nvSpPr>
+          <p:spPr>
+            <a:xfrm>
+              <a:off x="3474721" y="2708707"/>
+              <a:ext cx="1261640" cy="347889"/>
+            </a:xfrm>
+            <a:prstGeom prst="rect">
+              <a:avLst/>
+            </a:prstGeom>
+            <a:solidFill>
+              <a:schemeClr val="bg1"/>
+            </a:solidFill>
+            <a:ln>
+              <a:solidFill>
+                <a:schemeClr val="tx1"/>
+              </a:solidFill>
+            </a:ln>
+          </p:spPr>
+          <p:style>
+            <a:lnRef idx="2">
+              <a:schemeClr val="accent1">
+                <a:shade val="50000"/>
+              </a:schemeClr>
+            </a:lnRef>
+            <a:fillRef idx="1">
+              <a:schemeClr val="accent1"/>
+            </a:fillRef>
+            <a:effectRef idx="0">
+              <a:schemeClr val="accent1"/>
+            </a:effectRef>
+            <a:fontRef idx="minor">
+              <a:schemeClr val="lt1"/>
+            </a:fontRef>
+          </p:style>
+          <p:txBody>
+            <a:bodyPr rtlCol="0" anchor="ctr"/>
+            <a:lstStyle/>
+            <a:p>
+              <a:pPr algn="ctr"/>
+              <a:r>
+                <a:rPr lang="en-US" dirty="0" smtClean="0">
+                  <a:solidFill>
+                    <a:schemeClr val="tx1"/>
+                  </a:solidFill>
+                </a:rPr>
+                <a:t>PGIR</a:t>
+              </a:r>
+              <a:endParaRPr lang="en-US" dirty="0">
+                <a:solidFill>
+                  <a:schemeClr val="tx1"/>
+                </a:solidFill>
+              </a:endParaRPr>
+            </a:p>
+          </p:txBody>
+        </p:sp>
+        <p:sp>
+          <p:nvSpPr>
+            <p:cNvPr id="10" name="Rectangle 9"/>
+            <p:cNvSpPr/>
+            <p:nvPr/>
+          </p:nvSpPr>
+          <p:spPr>
+            <a:xfrm>
+              <a:off x="3474721" y="3358947"/>
+              <a:ext cx="1261640" cy="347889"/>
+            </a:xfrm>
+            <a:prstGeom prst="rect">
+              <a:avLst/>
+            </a:prstGeom>
+            <a:solidFill>
+              <a:schemeClr val="bg1"/>
+            </a:solidFill>
+            <a:ln>
+              <a:solidFill>
+                <a:schemeClr val="tx1"/>
+              </a:solidFill>
+            </a:ln>
+          </p:spPr>
+          <p:style>
+            <a:lnRef idx="2">
+              <a:schemeClr val="accent1">
+                <a:shade val="50000"/>
+              </a:schemeClr>
+            </a:lnRef>
+            <a:fillRef idx="1">
+              <a:schemeClr val="accent1"/>
+            </a:fillRef>
+            <a:effectRef idx="0">
+              <a:schemeClr val="accent1"/>
+            </a:effectRef>
+            <a:fontRef idx="minor">
+              <a:schemeClr val="lt1"/>
+            </a:fontRef>
+          </p:style>
+          <p:txBody>
+            <a:bodyPr rtlCol="0" anchor="ctr"/>
+            <a:lstStyle/>
+            <a:p>
+              <a:pPr algn="ctr"/>
+              <a:r>
+                <a:rPr lang="en-US" dirty="0" smtClean="0">
+                  <a:solidFill>
+                    <a:schemeClr val="tx1"/>
+                  </a:solidFill>
+                </a:rPr>
+                <a:t>ABGP</a:t>
+              </a:r>
+              <a:endParaRPr lang="en-US" dirty="0">
+                <a:solidFill>
+                  <a:schemeClr val="tx1"/>
+                </a:solidFill>
+              </a:endParaRPr>
+            </a:p>
+          </p:txBody>
+        </p:sp>
+        <p:sp>
+          <p:nvSpPr>
+            <p:cNvPr id="11" name="Rectangle 10"/>
+            <p:cNvSpPr/>
+            <p:nvPr/>
+          </p:nvSpPr>
+          <p:spPr>
+            <a:xfrm>
+              <a:off x="2913577" y="3956148"/>
+              <a:ext cx="1069144" cy="374694"/>
+            </a:xfrm>
+            <a:prstGeom prst="rect">
+              <a:avLst/>
+            </a:prstGeom>
+            <a:solidFill>
+              <a:schemeClr val="bg1"/>
+            </a:solidFill>
+            <a:ln>
+              <a:solidFill>
+                <a:schemeClr val="tx1"/>
+              </a:solidFill>
+            </a:ln>
+          </p:spPr>
+          <p:style>
+            <a:lnRef idx="2">
+              <a:schemeClr val="accent1">
+                <a:shade val="50000"/>
+              </a:schemeClr>
+            </a:lnRef>
+            <a:fillRef idx="1">
+              <a:schemeClr val="accent1"/>
+            </a:fillRef>
+            <a:effectRef idx="0">
+              <a:schemeClr val="accent1"/>
+            </a:effectRef>
+            <a:fontRef idx="minor">
+              <a:schemeClr val="lt1"/>
+            </a:fontRef>
+          </p:style>
+          <p:txBody>
+            <a:bodyPr rtlCol="0" anchor="ctr"/>
+            <a:lstStyle/>
+            <a:p>
+              <a:pPr algn="ctr"/>
+              <a:r>
+                <a:rPr lang="en-US" dirty="0" smtClean="0">
+                  <a:solidFill>
+                    <a:schemeClr val="tx1"/>
+                  </a:solidFill>
+                </a:rPr>
+                <a:t>Cisco</a:t>
+              </a:r>
+              <a:endParaRPr lang="en-US" dirty="0">
+                <a:solidFill>
+                  <a:schemeClr val="tx1"/>
+                </a:solidFill>
+              </a:endParaRPr>
+            </a:p>
+          </p:txBody>
+        </p:sp>
+        <p:sp>
+          <p:nvSpPr>
+            <p:cNvPr id="12" name="Rectangle 11"/>
+            <p:cNvSpPr/>
+            <p:nvPr/>
+          </p:nvSpPr>
+          <p:spPr>
+            <a:xfrm>
+              <a:off x="4289865" y="3956147"/>
+              <a:ext cx="1069144" cy="374694"/>
+            </a:xfrm>
+            <a:prstGeom prst="rect">
+              <a:avLst/>
+            </a:prstGeom>
+            <a:solidFill>
+              <a:schemeClr val="bg1"/>
+            </a:solidFill>
+            <a:ln>
+              <a:solidFill>
+                <a:schemeClr val="tx1"/>
+              </a:solidFill>
+            </a:ln>
+          </p:spPr>
+          <p:style>
+            <a:lnRef idx="2">
+              <a:schemeClr val="accent1">
+                <a:shade val="50000"/>
+              </a:schemeClr>
+            </a:lnRef>
+            <a:fillRef idx="1">
+              <a:schemeClr val="accent1"/>
+            </a:fillRef>
+            <a:effectRef idx="0">
+              <a:schemeClr val="accent1"/>
+            </a:effectRef>
+            <a:fontRef idx="minor">
+              <a:schemeClr val="lt1"/>
+            </a:fontRef>
+          </p:style>
+          <p:txBody>
+            <a:bodyPr rtlCol="0" anchor="ctr"/>
+            <a:lstStyle/>
+            <a:p>
+              <a:pPr algn="ctr"/>
+              <a:r>
+                <a:rPr lang="en-US" dirty="0" smtClean="0">
+                  <a:solidFill>
+                    <a:schemeClr val="tx1"/>
+                  </a:solidFill>
+                </a:rPr>
+                <a:t>Juniper</a:t>
+              </a:r>
+              <a:endParaRPr lang="en-US" dirty="0">
+                <a:solidFill>
+                  <a:schemeClr val="tx1"/>
+                </a:solidFill>
+              </a:endParaRPr>
+            </a:p>
+          </p:txBody>
+        </p:sp>
+        <p:cxnSp>
+          <p:nvCxnSpPr>
+            <p:cNvPr id="14" name="Straight Arrow Connector 13"/>
+            <p:cNvCxnSpPr>
+              <a:stCxn id="4" idx="2"/>
+              <a:endCxn id="8" idx="0"/>
+            </p:cNvCxnSpPr>
+            <p:nvPr/>
+          </p:nvCxnSpPr>
+          <p:spPr>
+            <a:xfrm>
+              <a:off x="4105541" y="1784253"/>
+              <a:ext cx="0" cy="288282"/>
+            </a:xfrm>
+            <a:prstGeom prst="straightConnector1">
+              <a:avLst/>
+            </a:prstGeom>
+            <a:ln w="38100">
+              <a:solidFill>
+                <a:schemeClr val="tx1"/>
+              </a:solidFill>
+              <a:tailEnd type="triangle"/>
+            </a:ln>
+          </p:spPr>
+          <p:style>
+            <a:lnRef idx="1">
+              <a:schemeClr val="accent1"/>
+            </a:lnRef>
+            <a:fillRef idx="0">
+              <a:schemeClr val="accent1"/>
+            </a:fillRef>
+            <a:effectRef idx="0">
+              <a:schemeClr val="accent1"/>
+            </a:effectRef>
+            <a:fontRef idx="minor">
+              <a:schemeClr val="tx1"/>
+            </a:fontRef>
+          </p:style>
+        </p:cxnSp>
+        <p:cxnSp>
+          <p:nvCxnSpPr>
+            <p:cNvPr id="15" name="Straight Arrow Connector 14"/>
+            <p:cNvCxnSpPr>
+              <a:stCxn id="8" idx="2"/>
+              <a:endCxn id="9" idx="0"/>
+            </p:cNvCxnSpPr>
+            <p:nvPr/>
+          </p:nvCxnSpPr>
+          <p:spPr>
+            <a:xfrm>
+              <a:off x="4105541" y="2420424"/>
+              <a:ext cx="0" cy="288283"/>
+            </a:xfrm>
+            <a:prstGeom prst="straightConnector1">
+              <a:avLst/>
+            </a:prstGeom>
+            <a:ln w="38100">
+              <a:solidFill>
+                <a:schemeClr val="tx1"/>
+              </a:solidFill>
+              <a:tailEnd type="triangle"/>
+            </a:ln>
+          </p:spPr>
+          <p:style>
+            <a:lnRef idx="1">
+              <a:schemeClr val="accent1"/>
+            </a:lnRef>
+            <a:fillRef idx="0">
+              <a:schemeClr val="accent1"/>
+            </a:fillRef>
+            <a:effectRef idx="0">
+              <a:schemeClr val="accent1"/>
+            </a:effectRef>
+            <a:fontRef idx="minor">
+              <a:schemeClr val="tx1"/>
+            </a:fontRef>
+          </p:style>
+        </p:cxnSp>
+        <p:cxnSp>
+          <p:nvCxnSpPr>
+            <p:cNvPr id="16" name="Straight Arrow Connector 15"/>
+            <p:cNvCxnSpPr>
+              <a:stCxn id="9" idx="2"/>
+              <a:endCxn id="10" idx="0"/>
+            </p:cNvCxnSpPr>
+            <p:nvPr/>
+          </p:nvCxnSpPr>
+          <p:spPr>
+            <a:xfrm>
+              <a:off x="4105541" y="3056596"/>
+              <a:ext cx="0" cy="302351"/>
+            </a:xfrm>
+            <a:prstGeom prst="straightConnector1">
+              <a:avLst/>
+            </a:prstGeom>
+            <a:ln w="38100">
+              <a:solidFill>
+                <a:schemeClr val="tx1"/>
+              </a:solidFill>
+              <a:tailEnd type="triangle"/>
+            </a:ln>
+          </p:spPr>
+          <p:style>
+            <a:lnRef idx="1">
+              <a:schemeClr val="accent1"/>
+            </a:lnRef>
+            <a:fillRef idx="0">
+              <a:schemeClr val="accent1"/>
+            </a:fillRef>
+            <a:effectRef idx="0">
+              <a:schemeClr val="accent1"/>
+            </a:effectRef>
+            <a:fontRef idx="minor">
+              <a:schemeClr val="tx1"/>
+            </a:fontRef>
+          </p:style>
+        </p:cxnSp>
+        <p:cxnSp>
+          <p:nvCxnSpPr>
+            <p:cNvPr id="17" name="Straight Arrow Connector 16"/>
+            <p:cNvCxnSpPr>
+              <a:stCxn id="10" idx="2"/>
+              <a:endCxn id="11" idx="0"/>
+            </p:cNvCxnSpPr>
+            <p:nvPr/>
+          </p:nvCxnSpPr>
+          <p:spPr>
+            <a:xfrm flipH="1">
+              <a:off x="3448149" y="3706836"/>
+              <a:ext cx="657392" cy="249312"/>
+            </a:xfrm>
+            <a:prstGeom prst="straightConnector1">
+              <a:avLst/>
+            </a:prstGeom>
+            <a:ln w="38100">
+              <a:solidFill>
+                <a:schemeClr val="tx1"/>
+              </a:solidFill>
+              <a:prstDash val="solid"/>
+              <a:tailEnd type="triangle"/>
+            </a:ln>
+          </p:spPr>
+          <p:style>
+            <a:lnRef idx="1">
+              <a:schemeClr val="accent1"/>
+            </a:lnRef>
+            <a:fillRef idx="0">
+              <a:schemeClr val="accent1"/>
+            </a:fillRef>
+            <a:effectRef idx="0">
+              <a:schemeClr val="accent1"/>
+            </a:effectRef>
+            <a:fontRef idx="minor">
+              <a:schemeClr val="tx1"/>
+            </a:fontRef>
+          </p:style>
+        </p:cxnSp>
+        <p:cxnSp>
+          <p:nvCxnSpPr>
+            <p:cNvPr id="21" name="Straight Arrow Connector 20"/>
+            <p:cNvCxnSpPr>
+              <a:stCxn id="10" idx="2"/>
+              <a:endCxn id="12" idx="0"/>
+            </p:cNvCxnSpPr>
+            <p:nvPr/>
+          </p:nvCxnSpPr>
+          <p:spPr>
+            <a:xfrm>
+              <a:off x="4105541" y="3706836"/>
+              <a:ext cx="718896" cy="249311"/>
+            </a:xfrm>
+            <a:prstGeom prst="straightConnector1">
+              <a:avLst/>
+            </a:prstGeom>
+            <a:ln w="38100">
+              <a:solidFill>
+                <a:schemeClr val="tx1"/>
+              </a:solidFill>
+              <a:prstDash val="solid"/>
+              <a:tailEnd type="triangle"/>
+            </a:ln>
+          </p:spPr>
+          <p:style>
+            <a:lnRef idx="1">
+              <a:schemeClr val="accent1"/>
+            </a:lnRef>
+            <a:fillRef idx="0">
+              <a:schemeClr val="accent1"/>
+            </a:fillRef>
+            <a:effectRef idx="0">
+              <a:schemeClr val="accent1"/>
+            </a:effectRef>
+            <a:fontRef idx="minor">
+              <a:schemeClr val="tx1"/>
+            </a:fontRef>
+          </p:style>
+        </p:cxnSp>
+        <p:sp>
+          <p:nvSpPr>
+            <p:cNvPr id="27" name="TextBox 26"/>
+            <p:cNvSpPr txBox="1"/>
+            <p:nvPr/>
+          </p:nvSpPr>
+          <p:spPr>
+            <a:xfrm>
+              <a:off x="4837824" y="2561517"/>
+              <a:ext cx="2001702" cy="646331"/>
+            </a:xfrm>
+            <a:prstGeom prst="rect">
+              <a:avLst/>
+            </a:prstGeom>
+            <a:noFill/>
+          </p:spPr>
+          <p:txBody>
+            <a:bodyPr wrap="none" rtlCol="0">
+              <a:spAutoFit/>
+            </a:bodyPr>
+            <a:lstStyle/>
+            <a:p>
+              <a:r>
+                <a:rPr lang="en-US" dirty="0" smtClean="0">
+                  <a:solidFill>
+                    <a:schemeClr val="tx1">
+                      <a:lumMod val="50000"/>
+                      <a:lumOff val="50000"/>
+                    </a:schemeClr>
+                  </a:solidFill>
+                </a:rPr>
+                <a:t>BGP Control Graph</a:t>
+              </a:r>
+            </a:p>
+            <a:p>
+              <a:r>
+                <a:rPr lang="en-US" dirty="0" smtClean="0">
+                  <a:solidFill>
+                    <a:schemeClr val="tx1">
+                      <a:lumMod val="50000"/>
+                      <a:lumOff val="50000"/>
+                    </a:schemeClr>
+                  </a:solidFill>
+                </a:rPr>
+                <a:t>Safety Analysis</a:t>
+              </a:r>
+              <a:endParaRPr lang="en-US" dirty="0">
+                <a:solidFill>
+                  <a:schemeClr val="tx1">
+                    <a:lumMod val="50000"/>
+                    <a:lumOff val="50000"/>
+                  </a:schemeClr>
+                </a:solidFill>
+              </a:endParaRPr>
+            </a:p>
+          </p:txBody>
+        </p:sp>
+        <p:sp>
+          <p:nvSpPr>
+            <p:cNvPr id="28" name="Rectangle 27"/>
+            <p:cNvSpPr/>
+            <p:nvPr/>
+          </p:nvSpPr>
+          <p:spPr>
+            <a:xfrm>
+              <a:off x="1992537" y="2708707"/>
+              <a:ext cx="1069144" cy="347889"/>
+            </a:xfrm>
+            <a:prstGeom prst="rect">
+              <a:avLst/>
+            </a:prstGeom>
+            <a:solidFill>
+              <a:schemeClr val="bg1"/>
+            </a:solidFill>
+            <a:ln>
+              <a:solidFill>
+                <a:schemeClr val="tx1"/>
+              </a:solidFill>
+            </a:ln>
+          </p:spPr>
+          <p:style>
+            <a:lnRef idx="2">
+              <a:schemeClr val="accent1">
+                <a:shade val="50000"/>
+              </a:schemeClr>
+            </a:lnRef>
+            <a:fillRef idx="1">
+              <a:schemeClr val="accent1"/>
+            </a:fillRef>
+            <a:effectRef idx="0">
+              <a:schemeClr val="accent1"/>
+            </a:effectRef>
+            <a:fontRef idx="minor">
+              <a:schemeClr val="lt1"/>
+            </a:fontRef>
+          </p:style>
+          <p:txBody>
+            <a:bodyPr rtlCol="0" anchor="ctr"/>
+            <a:lstStyle/>
+            <a:p>
+              <a:pPr algn="ctr"/>
+              <a:r>
+                <a:rPr lang="en-US" dirty="0" smtClean="0">
+                  <a:solidFill>
+                    <a:schemeClr val="tx1"/>
+                  </a:solidFill>
+                </a:rPr>
+                <a:t>Topology</a:t>
+              </a:r>
+              <a:endParaRPr lang="en-US" dirty="0">
+                <a:solidFill>
+                  <a:schemeClr val="tx1"/>
+                </a:solidFill>
+              </a:endParaRPr>
+            </a:p>
+          </p:txBody>
+        </p:sp>
+        <p:cxnSp>
+          <p:nvCxnSpPr>
+            <p:cNvPr id="29" name="Straight Arrow Connector 28"/>
+            <p:cNvCxnSpPr>
+              <a:stCxn id="28" idx="3"/>
+              <a:endCxn id="9" idx="1"/>
+            </p:cNvCxnSpPr>
+            <p:nvPr/>
+          </p:nvCxnSpPr>
+          <p:spPr>
+            <a:xfrm>
+              <a:off x="3061681" y="2882652"/>
+              <a:ext cx="413040" cy="0"/>
+            </a:xfrm>
+            <a:prstGeom prst="straightConnector1">
+              <a:avLst/>
+            </a:prstGeom>
+            <a:ln w="38100">
+              <a:solidFill>
+                <a:schemeClr val="tx1"/>
+              </a:solidFill>
+              <a:tailEnd type="triangle"/>
+            </a:ln>
+          </p:spPr>
+          <p:style>
+            <a:lnRef idx="1">
+              <a:schemeClr val="accent1"/>
+            </a:lnRef>
+            <a:fillRef idx="0">
+              <a:schemeClr val="accent1"/>
+            </a:fillRef>
+            <a:effectRef idx="0">
+              <a:schemeClr val="accent1"/>
+            </a:effectRef>
+            <a:fontRef idx="minor">
+              <a:schemeClr val="tx1"/>
+            </a:fontRef>
+          </p:style>
+        </p:cxnSp>
+        <p:sp>
+          <p:nvSpPr>
+            <p:cNvPr id="32" name="Rectangle 31"/>
+            <p:cNvSpPr/>
+            <p:nvPr/>
+          </p:nvSpPr>
+          <p:spPr>
+            <a:xfrm>
+              <a:off x="1505481" y="1427871"/>
+              <a:ext cx="1683200" cy="351693"/>
+            </a:xfrm>
+            <a:prstGeom prst="rect">
+              <a:avLst/>
+            </a:prstGeom>
+            <a:solidFill>
+              <a:schemeClr val="bg1"/>
+            </a:solidFill>
+            <a:ln>
+              <a:solidFill>
+                <a:schemeClr val="tx1"/>
+              </a:solidFill>
+            </a:ln>
+          </p:spPr>
+          <p:style>
+            <a:lnRef idx="2">
+              <a:schemeClr val="accent1">
+                <a:shade val="50000"/>
+              </a:schemeClr>
+            </a:lnRef>
+            <a:fillRef idx="1">
+              <a:schemeClr val="accent1"/>
+            </a:fillRef>
+            <a:effectRef idx="0">
+              <a:schemeClr val="accent1"/>
+            </a:effectRef>
+            <a:fontRef idx="minor">
+              <a:schemeClr val="lt1"/>
+            </a:fontRef>
+          </p:style>
+          <p:txBody>
+            <a:bodyPr rtlCol="0" anchor="ctr"/>
+            <a:lstStyle/>
+            <a:p>
+              <a:pPr algn="ctr"/>
+              <a:r>
+                <a:rPr lang="en-US" dirty="0" smtClean="0">
+                  <a:solidFill>
+                    <a:schemeClr val="tx1"/>
+                  </a:solidFill>
+                </a:rPr>
+                <a:t>Network Policy</a:t>
+              </a:r>
+              <a:endParaRPr lang="en-US" dirty="0">
+                <a:solidFill>
+                  <a:schemeClr val="tx1"/>
+                </a:solidFill>
+              </a:endParaRPr>
+            </a:p>
+          </p:txBody>
+        </p:sp>
+        <p:cxnSp>
+          <p:nvCxnSpPr>
+            <p:cNvPr id="33" name="Straight Arrow Connector 32"/>
+            <p:cNvCxnSpPr>
+              <a:stCxn id="32" idx="3"/>
+              <a:endCxn id="4" idx="1"/>
+            </p:cNvCxnSpPr>
+            <p:nvPr/>
+          </p:nvCxnSpPr>
+          <p:spPr>
+            <a:xfrm>
+              <a:off x="3188681" y="1603718"/>
+              <a:ext cx="286040" cy="4689"/>
+            </a:xfrm>
+            <a:prstGeom prst="straightConnector1">
+              <a:avLst/>
+            </a:prstGeom>
+            <a:ln w="38100">
+              <a:solidFill>
+                <a:schemeClr val="tx1"/>
+              </a:solidFill>
+              <a:tailEnd type="triangle"/>
+            </a:ln>
+          </p:spPr>
+          <p:style>
+            <a:lnRef idx="1">
+              <a:schemeClr val="accent1"/>
+            </a:lnRef>
+            <a:fillRef idx="0">
+              <a:schemeClr val="accent1"/>
+            </a:fillRef>
+            <a:effectRef idx="0">
+              <a:schemeClr val="accent1"/>
+            </a:effectRef>
+            <a:fontRef idx="minor">
+              <a:schemeClr val="tx1"/>
+            </a:fontRef>
+          </p:style>
+        </p:cxnSp>
+        <p:sp>
+          <p:nvSpPr>
+            <p:cNvPr id="34" name="TextBox 33"/>
+            <p:cNvSpPr txBox="1"/>
+            <p:nvPr/>
+          </p:nvSpPr>
+          <p:spPr>
+            <a:xfrm>
               <a:off x="4861153" y="3209725"/>
               <a:ext cx="1944571" cy="646331"/>
             </a:xfrm>
@@ -3860,18 +5280,7 @@
                     </a:schemeClr>
                   </a:solidFill>
                 </a:rPr>
-                <a:t>+ </a:t>
-              </a:r>
-              <a:r>
-                <a:rPr lang="en-US" dirty="0" smtClean="0">
-                  <a:solidFill>
-                    <a:schemeClr val="tx1">
-                      <a:lumMod val="50000"/>
-                      <a:lumOff val="50000"/>
-                    </a:schemeClr>
-                  </a:solidFill>
-                </a:rPr>
-                <a:t>Minimization</a:t>
+                <a:t>+ Minimization</a:t>
               </a:r>
               <a:endParaRPr lang="en-US" dirty="0">
                 <a:solidFill>
@@ -4268,7 +5677,7 @@
     </p:spTree>
     <p:extLst>
       <p:ext uri="{BB962C8B-B14F-4D97-AF65-F5344CB8AC3E}">
-        <p14:creationId xmlns:p14="http://schemas.microsoft.com/office/powerpoint/2010/main" val="3044673839"/>
+        <p14:creationId xmlns:p14="http://schemas.microsoft.com/office/powerpoint/2010/main" val="1587295670"/>
       </p:ext>
     </p:extLst>
   </p:cSld>
@@ -4285,7 +5694,7 @@
 </p:sld>
 </file>
 
-<file path=ppt/slides/slide2.xml><?xml version="1.0" encoding="utf-8"?>
+<file path=ppt/slides/slide3.xml><?xml version="1.0" encoding="utf-8"?>
 <p:sld xmlns:a="http://schemas.openxmlformats.org/drawingml/2006/main" xmlns:r="http://schemas.openxmlformats.org/officeDocument/2006/relationships" xmlns:p="http://schemas.openxmlformats.org/presentationml/2006/main">
   <p:cSld>
     <p:spTree>
@@ -4346,7 +5755,7 @@
 </p:sld>
 </file>
 
-<file path=ppt/slides/slide3.xml><?xml version="1.0" encoding="utf-8"?>
+<file path=ppt/slides/slide4.xml><?xml version="1.0" encoding="utf-8"?>
 <p:sld xmlns:a="http://schemas.openxmlformats.org/drawingml/2006/main" xmlns:r="http://schemas.openxmlformats.org/officeDocument/2006/relationships" xmlns:p="http://schemas.openxmlformats.org/presentationml/2006/main">
   <p:cSld>
     <p:spTree>
@@ -4391,6 +5800,60 @@
     <p:extLst>
       <p:ext uri="{BB962C8B-B14F-4D97-AF65-F5344CB8AC3E}">
         <p14:creationId xmlns:p14="http://schemas.microsoft.com/office/powerpoint/2010/main" val="4055581249"/>
+      </p:ext>
+    </p:extLst>
+  </p:cSld>
+  <p:clrMapOvr>
+    <a:masterClrMapping/>
+  </p:clrMapOvr>
+</p:sld>
+</file>
+
+<file path=ppt/slides/slide5.xml><?xml version="1.0" encoding="utf-8"?>
+<p:sld xmlns:a="http://schemas.openxmlformats.org/drawingml/2006/main" xmlns:r="http://schemas.openxmlformats.org/officeDocument/2006/relationships" xmlns:p="http://schemas.openxmlformats.org/presentationml/2006/main">
+  <p:cSld>
+    <p:spTree>
+      <p:nvGrpSpPr>
+        <p:cNvPr id="1" name=""/>
+        <p:cNvGrpSpPr/>
+        <p:nvPr/>
+      </p:nvGrpSpPr>
+      <p:grpSpPr>
+        <a:xfrm>
+          <a:off x="0" y="0"/>
+          <a:ext cx="0" cy="0"/>
+          <a:chOff x="0" y="0"/>
+          <a:chExt cx="0" cy="0"/>
+        </a:xfrm>
+      </p:grpSpPr>
+      <p:pic>
+        <p:nvPicPr>
+          <p:cNvPr id="26" name="Picture 25"/>
+          <p:cNvPicPr>
+            <a:picLocks noChangeAspect="1"/>
+          </p:cNvPicPr>
+          <p:nvPr/>
+        </p:nvPicPr>
+        <p:blipFill>
+          <a:blip r:embed="rId2"/>
+          <a:stretch>
+            <a:fillRect/>
+          </a:stretch>
+        </p:blipFill>
+        <p:spPr>
+          <a:xfrm>
+            <a:off x="3429000" y="1911350"/>
+            <a:ext cx="5334000" cy="3035300"/>
+          </a:xfrm>
+          <a:prstGeom prst="rect">
+            <a:avLst/>
+          </a:prstGeom>
+        </p:spPr>
+      </p:pic>
+    </p:spTree>
+    <p:extLst>
+      <p:ext uri="{BB962C8B-B14F-4D97-AF65-F5344CB8AC3E}">
+        <p14:creationId xmlns:p14="http://schemas.microsoft.com/office/powerpoint/2010/main" val="1454052492"/>
       </p:ext>
     </p:extLst>
   </p:cSld>

</xml_diff>